<commit_message>
update name module: calendar
</commit_message>
<xml_diff>
--- a/Projetos/Projetos 2014/curso-BlendedParaDocentes/certificados/editaveis/MODELO_EST.pptx
+++ b/Projetos/Projetos 2014/curso-BlendedParaDocentes/certificados/editaveis/MODELO_EST.pptx
@@ -289,7 +289,7 @@
           <a:p>
             <a:fld id="{89C11ABA-0547-D742-98E3-363B6946534B}" type="datetimeFigureOut">
               <a:rPr lang="en-US" smtClean="0"/>
-              <a:t>12/03/15</a:t>
+              <a:t>09/06/15</a:t>
             </a:fld>
             <a:endParaRPr lang="en-US"/>
           </a:p>
@@ -459,7 +459,7 @@
           <a:p>
             <a:fld id="{89C11ABA-0547-D742-98E3-363B6946534B}" type="datetimeFigureOut">
               <a:rPr lang="en-US" smtClean="0"/>
-              <a:t>12/03/15</a:t>
+              <a:t>09/06/15</a:t>
             </a:fld>
             <a:endParaRPr lang="en-US"/>
           </a:p>
@@ -639,7 +639,7 @@
           <a:p>
             <a:fld id="{89C11ABA-0547-D742-98E3-363B6946534B}" type="datetimeFigureOut">
               <a:rPr lang="en-US" smtClean="0"/>
-              <a:t>12/03/15</a:t>
+              <a:t>09/06/15</a:t>
             </a:fld>
             <a:endParaRPr lang="en-US"/>
           </a:p>
@@ -809,7 +809,7 @@
           <a:p>
             <a:fld id="{89C11ABA-0547-D742-98E3-363B6946534B}" type="datetimeFigureOut">
               <a:rPr lang="en-US" smtClean="0"/>
-              <a:t>12/03/15</a:t>
+              <a:t>09/06/15</a:t>
             </a:fld>
             <a:endParaRPr lang="en-US"/>
           </a:p>
@@ -1055,7 +1055,7 @@
           <a:p>
             <a:fld id="{89C11ABA-0547-D742-98E3-363B6946534B}" type="datetimeFigureOut">
               <a:rPr lang="en-US" smtClean="0"/>
-              <a:t>12/03/15</a:t>
+              <a:t>09/06/15</a:t>
             </a:fld>
             <a:endParaRPr lang="en-US"/>
           </a:p>
@@ -1343,7 +1343,7 @@
           <a:p>
             <a:fld id="{89C11ABA-0547-D742-98E3-363B6946534B}" type="datetimeFigureOut">
               <a:rPr lang="en-US" smtClean="0"/>
-              <a:t>12/03/15</a:t>
+              <a:t>09/06/15</a:t>
             </a:fld>
             <a:endParaRPr lang="en-US"/>
           </a:p>
@@ -1765,7 +1765,7 @@
           <a:p>
             <a:fld id="{89C11ABA-0547-D742-98E3-363B6946534B}" type="datetimeFigureOut">
               <a:rPr lang="en-US" smtClean="0"/>
-              <a:t>12/03/15</a:t>
+              <a:t>09/06/15</a:t>
             </a:fld>
             <a:endParaRPr lang="en-US"/>
           </a:p>
@@ -1883,7 +1883,7 @@
           <a:p>
             <a:fld id="{89C11ABA-0547-D742-98E3-363B6946534B}" type="datetimeFigureOut">
               <a:rPr lang="en-US" smtClean="0"/>
-              <a:t>12/03/15</a:t>
+              <a:t>09/06/15</a:t>
             </a:fld>
             <a:endParaRPr lang="en-US"/>
           </a:p>
@@ -1978,7 +1978,7 @@
           <a:p>
             <a:fld id="{89C11ABA-0547-D742-98E3-363B6946534B}" type="datetimeFigureOut">
               <a:rPr lang="en-US" smtClean="0"/>
-              <a:t>12/03/15</a:t>
+              <a:t>09/06/15</a:t>
             </a:fld>
             <a:endParaRPr lang="en-US"/>
           </a:p>
@@ -2255,7 +2255,7 @@
           <a:p>
             <a:fld id="{89C11ABA-0547-D742-98E3-363B6946534B}" type="datetimeFigureOut">
               <a:rPr lang="en-US" smtClean="0"/>
-              <a:t>12/03/15</a:t>
+              <a:t>09/06/15</a:t>
             </a:fld>
             <a:endParaRPr lang="en-US"/>
           </a:p>
@@ -2508,7 +2508,7 @@
           <a:p>
             <a:fld id="{89C11ABA-0547-D742-98E3-363B6946534B}" type="datetimeFigureOut">
               <a:rPr lang="en-US" smtClean="0"/>
-              <a:t>12/03/15</a:t>
+              <a:t>09/06/15</a:t>
             </a:fld>
             <a:endParaRPr lang="en-US"/>
           </a:p>
@@ -2721,7 +2721,7 @@
           <a:p>
             <a:fld id="{89C11ABA-0547-D742-98E3-363B6946534B}" type="datetimeFigureOut">
               <a:rPr lang="en-US" smtClean="0"/>
-              <a:t>12/03/15</a:t>
+              <a:t>09/06/15</a:t>
             </a:fld>
             <a:endParaRPr lang="en-US"/>
           </a:p>
@@ -3119,7 +3119,7 @@
         <p:spPr>
           <a:xfrm>
             <a:off x="101600" y="0"/>
-            <a:ext cx="9698223" cy="6857999"/>
+            <a:ext cx="9698222" cy="6857999"/>
           </a:xfrm>
           <a:prstGeom prst="rect">
             <a:avLst/>

</xml_diff>